<commit_message>
Update of results presentation
</commit_message>
<xml_diff>
--- a/Presentations/Results presentation 15-12-2020.pptx
+++ b/Presentations/Results presentation 15-12-2020.pptx
@@ -133,7 +133,7 @@
 <file path=ppt/revisionInfo.xml><?xml version="1.0" encoding="utf-8"?>
 <p1510:revInfo xmlns:a="http://schemas.openxmlformats.org/drawingml/2006/main" xmlns:r="http://schemas.openxmlformats.org/officeDocument/2006/relationships" xmlns:p1510="http://schemas.microsoft.com/office/powerpoint/2015/10/main">
   <p1510:revLst>
-    <p1510:client id="{88D7729A-F1F9-4A2A-82A7-B3C65F13AF94}" v="143" dt="2020-12-16T20:41:10.370"/>
+    <p1510:client id="{88D7729A-F1F9-4A2A-82A7-B3C65F13AF94}" v="147" dt="2020-12-21T15:36:16.251"/>
   </p1510:revLst>
 </p1510:revInfo>
 </file>
@@ -143,7 +143,7 @@
   <pc:docChgLst>
     <pc:chgData name="benjamin Skjold" userId="c95198f139ad621b" providerId="LiveId" clId="{88D7729A-F1F9-4A2A-82A7-B3C65F13AF94}"/>
     <pc:docChg chg="undo custSel addSld delSld modSld sldOrd">
-      <pc:chgData name="benjamin Skjold" userId="c95198f139ad621b" providerId="LiveId" clId="{88D7729A-F1F9-4A2A-82A7-B3C65F13AF94}" dt="2020-12-17T08:59:59.743" v="658" actId="166"/>
+      <pc:chgData name="benjamin Skjold" userId="c95198f139ad621b" providerId="LiveId" clId="{88D7729A-F1F9-4A2A-82A7-B3C65F13AF94}" dt="2020-12-21T15:36:16.247" v="711" actId="14826"/>
       <pc:docMkLst>
         <pc:docMk/>
       </pc:docMkLst>
@@ -194,7 +194,7 @@
         </pc:sldMkLst>
       </pc:sldChg>
       <pc:sldChg chg="addSp delSp modSp">
-        <pc:chgData name="benjamin Skjold" userId="c95198f139ad621b" providerId="LiveId" clId="{88D7729A-F1F9-4A2A-82A7-B3C65F13AF94}" dt="2020-12-16T08:55:55.904" v="303" actId="14100"/>
+        <pc:chgData name="benjamin Skjold" userId="c95198f139ad621b" providerId="LiveId" clId="{88D7729A-F1F9-4A2A-82A7-B3C65F13AF94}" dt="2020-12-21T15:36:16.247" v="711" actId="14826"/>
         <pc:sldMkLst>
           <pc:docMk/>
           <pc:sldMk cId="1101218464" sldId="259"/>
@@ -224,7 +224,7 @@
           </ac:spMkLst>
         </pc:spChg>
         <pc:spChg chg="add mod">
-          <ac:chgData name="benjamin Skjold" userId="c95198f139ad621b" providerId="LiveId" clId="{88D7729A-F1F9-4A2A-82A7-B3C65F13AF94}" dt="2020-12-16T08:51:53.142" v="298" actId="14100"/>
+          <ac:chgData name="benjamin Skjold" userId="c95198f139ad621b" providerId="LiveId" clId="{88D7729A-F1F9-4A2A-82A7-B3C65F13AF94}" dt="2020-12-21T15:35:41.372" v="707" actId="1036"/>
           <ac:spMkLst>
             <pc:docMk/>
             <pc:sldMk cId="1101218464" sldId="259"/>
@@ -232,7 +232,7 @@
           </ac:spMkLst>
         </pc:spChg>
         <pc:grpChg chg="add mod">
-          <ac:chgData name="benjamin Skjold" userId="c95198f139ad621b" providerId="LiveId" clId="{88D7729A-F1F9-4A2A-82A7-B3C65F13AF94}" dt="2020-12-16T08:54:53.678" v="301" actId="14826"/>
+          <ac:chgData name="benjamin Skjold" userId="c95198f139ad621b" providerId="LiveId" clId="{88D7729A-F1F9-4A2A-82A7-B3C65F13AF94}" dt="2020-12-21T15:36:16.247" v="711" actId="14826"/>
           <ac:grpSpMkLst>
             <pc:docMk/>
             <pc:sldMk cId="1101218464" sldId="259"/>
@@ -240,7 +240,7 @@
           </ac:grpSpMkLst>
         </pc:grpChg>
         <pc:grpChg chg="add mod">
-          <ac:chgData name="benjamin Skjold" userId="c95198f139ad621b" providerId="LiveId" clId="{88D7729A-F1F9-4A2A-82A7-B3C65F13AF94}" dt="2020-12-16T08:50:45.711" v="294" actId="14826"/>
+          <ac:chgData name="benjamin Skjold" userId="c95198f139ad621b" providerId="LiveId" clId="{88D7729A-F1F9-4A2A-82A7-B3C65F13AF94}" dt="2020-12-21T15:35:22.341" v="660" actId="14826"/>
           <ac:grpSpMkLst>
             <pc:docMk/>
             <pc:sldMk cId="1101218464" sldId="259"/>
@@ -264,7 +264,7 @@
           </ac:picMkLst>
         </pc:picChg>
         <pc:picChg chg="add mod">
-          <ac:chgData name="benjamin Skjold" userId="c95198f139ad621b" providerId="LiveId" clId="{88D7729A-F1F9-4A2A-82A7-B3C65F13AF94}" dt="2020-12-16T08:30:59.091" v="287" actId="164"/>
+          <ac:chgData name="benjamin Skjold" userId="c95198f139ad621b" providerId="LiveId" clId="{88D7729A-F1F9-4A2A-82A7-B3C65F13AF94}" dt="2020-12-21T15:35:22.341" v="660" actId="14826"/>
           <ac:picMkLst>
             <pc:docMk/>
             <pc:sldMk cId="1101218464" sldId="259"/>
@@ -280,7 +280,7 @@
           </ac:picMkLst>
         </pc:picChg>
         <pc:picChg chg="add mod">
-          <ac:chgData name="benjamin Skjold" userId="c95198f139ad621b" providerId="LiveId" clId="{88D7729A-F1F9-4A2A-82A7-B3C65F13AF94}" dt="2020-12-16T08:27:57.517" v="284" actId="164"/>
+          <ac:chgData name="benjamin Skjold" userId="c95198f139ad621b" providerId="LiveId" clId="{88D7729A-F1F9-4A2A-82A7-B3C65F13AF94}" dt="2020-12-21T15:36:08.201" v="710" actId="14826"/>
           <ac:picMkLst>
             <pc:docMk/>
             <pc:sldMk cId="1101218464" sldId="259"/>
@@ -288,7 +288,7 @@
           </ac:picMkLst>
         </pc:picChg>
         <pc:picChg chg="add mod">
-          <ac:chgData name="benjamin Skjold" userId="c95198f139ad621b" providerId="LiveId" clId="{88D7729A-F1F9-4A2A-82A7-B3C65F13AF94}" dt="2020-12-16T08:54:53.678" v="301" actId="14826"/>
+          <ac:chgData name="benjamin Skjold" userId="c95198f139ad621b" providerId="LiveId" clId="{88D7729A-F1F9-4A2A-82A7-B3C65F13AF94}" dt="2020-12-21T15:36:16.247" v="711" actId="14826"/>
           <ac:picMkLst>
             <pc:docMk/>
             <pc:sldMk cId="1101218464" sldId="259"/>
@@ -296,7 +296,7 @@
           </ac:picMkLst>
         </pc:picChg>
         <pc:picChg chg="add mod">
-          <ac:chgData name="benjamin Skjold" userId="c95198f139ad621b" providerId="LiveId" clId="{88D7729A-F1F9-4A2A-82A7-B3C65F13AF94}" dt="2020-12-16T08:50:45.711" v="294" actId="14826"/>
+          <ac:chgData name="benjamin Skjold" userId="c95198f139ad621b" providerId="LiveId" clId="{88D7729A-F1F9-4A2A-82A7-B3C65F13AF94}" dt="2020-12-21T15:35:08.900" v="659" actId="14826"/>
           <ac:picMkLst>
             <pc:docMk/>
             <pc:sldMk cId="1101218464" sldId="259"/>
@@ -336,7 +336,7 @@
           </ac:cxnSpMkLst>
         </pc:cxnChg>
         <pc:cxnChg chg="add mod">
-          <ac:chgData name="benjamin Skjold" userId="c95198f139ad621b" providerId="LiveId" clId="{88D7729A-F1F9-4A2A-82A7-B3C65F13AF94}" dt="2020-12-16T08:51:59.690" v="300" actId="14100"/>
+          <ac:chgData name="benjamin Skjold" userId="c95198f139ad621b" providerId="LiveId" clId="{88D7729A-F1F9-4A2A-82A7-B3C65F13AF94}" dt="2020-12-21T15:35:54.460" v="709" actId="14100"/>
           <ac:cxnSpMkLst>
             <pc:docMk/>
             <pc:sldMk cId="1101218464" sldId="259"/>
@@ -344,7 +344,7 @@
           </ac:cxnSpMkLst>
         </pc:cxnChg>
         <pc:cxnChg chg="add mod">
-          <ac:chgData name="benjamin Skjold" userId="c95198f139ad621b" providerId="LiveId" clId="{88D7729A-F1F9-4A2A-82A7-B3C65F13AF94}" dt="2020-12-16T08:51:56.453" v="299" actId="14100"/>
+          <ac:chgData name="benjamin Skjold" userId="c95198f139ad621b" providerId="LiveId" clId="{88D7729A-F1F9-4A2A-82A7-B3C65F13AF94}" dt="2020-12-21T15:35:51.687" v="708" actId="14100"/>
           <ac:cxnSpMkLst>
             <pc:docMk/>
             <pc:sldMk cId="1101218464" sldId="259"/>
@@ -790,7 +790,7 @@
           <a:p>
             <a:fld id="{316DB34A-2BC5-44F7-82CD-9ED99B745D5F}" type="datetimeFigureOut">
               <a:rPr lang="en-US" smtClean="0"/>
-              <a:t>12/17/2020</a:t>
+              <a:t>12/21/2020</a:t>
             </a:fld>
             <a:endParaRPr lang="en-US"/>
           </a:p>
@@ -990,7 +990,7 @@
           <a:p>
             <a:fld id="{316DB34A-2BC5-44F7-82CD-9ED99B745D5F}" type="datetimeFigureOut">
               <a:rPr lang="en-US" smtClean="0"/>
-              <a:t>12/17/2020</a:t>
+              <a:t>12/21/2020</a:t>
             </a:fld>
             <a:endParaRPr lang="en-US"/>
           </a:p>
@@ -1200,7 +1200,7 @@
           <a:p>
             <a:fld id="{316DB34A-2BC5-44F7-82CD-9ED99B745D5F}" type="datetimeFigureOut">
               <a:rPr lang="en-US" smtClean="0"/>
-              <a:t>12/17/2020</a:t>
+              <a:t>12/21/2020</a:t>
             </a:fld>
             <a:endParaRPr lang="en-US"/>
           </a:p>
@@ -1400,7 +1400,7 @@
           <a:p>
             <a:fld id="{316DB34A-2BC5-44F7-82CD-9ED99B745D5F}" type="datetimeFigureOut">
               <a:rPr lang="en-US" smtClean="0"/>
-              <a:t>12/17/2020</a:t>
+              <a:t>12/21/2020</a:t>
             </a:fld>
             <a:endParaRPr lang="en-US"/>
           </a:p>
@@ -1676,7 +1676,7 @@
           <a:p>
             <a:fld id="{316DB34A-2BC5-44F7-82CD-9ED99B745D5F}" type="datetimeFigureOut">
               <a:rPr lang="en-US" smtClean="0"/>
-              <a:t>12/17/2020</a:t>
+              <a:t>12/21/2020</a:t>
             </a:fld>
             <a:endParaRPr lang="en-US"/>
           </a:p>
@@ -1944,7 +1944,7 @@
           <a:p>
             <a:fld id="{316DB34A-2BC5-44F7-82CD-9ED99B745D5F}" type="datetimeFigureOut">
               <a:rPr lang="en-US" smtClean="0"/>
-              <a:t>12/17/2020</a:t>
+              <a:t>12/21/2020</a:t>
             </a:fld>
             <a:endParaRPr lang="en-US"/>
           </a:p>
@@ -2359,7 +2359,7 @@
           <a:p>
             <a:fld id="{316DB34A-2BC5-44F7-82CD-9ED99B745D5F}" type="datetimeFigureOut">
               <a:rPr lang="en-US" smtClean="0"/>
-              <a:t>12/17/2020</a:t>
+              <a:t>12/21/2020</a:t>
             </a:fld>
             <a:endParaRPr lang="en-US"/>
           </a:p>
@@ -2501,7 +2501,7 @@
           <a:p>
             <a:fld id="{316DB34A-2BC5-44F7-82CD-9ED99B745D5F}" type="datetimeFigureOut">
               <a:rPr lang="en-US" smtClean="0"/>
-              <a:t>12/17/2020</a:t>
+              <a:t>12/21/2020</a:t>
             </a:fld>
             <a:endParaRPr lang="en-US"/>
           </a:p>
@@ -2614,7 +2614,7 @@
           <a:p>
             <a:fld id="{316DB34A-2BC5-44F7-82CD-9ED99B745D5F}" type="datetimeFigureOut">
               <a:rPr lang="en-US" smtClean="0"/>
-              <a:t>12/17/2020</a:t>
+              <a:t>12/21/2020</a:t>
             </a:fld>
             <a:endParaRPr lang="en-US"/>
           </a:p>
@@ -2927,7 +2927,7 @@
           <a:p>
             <a:fld id="{316DB34A-2BC5-44F7-82CD-9ED99B745D5F}" type="datetimeFigureOut">
               <a:rPr lang="en-US" smtClean="0"/>
-              <a:t>12/17/2020</a:t>
+              <a:t>12/21/2020</a:t>
             </a:fld>
             <a:endParaRPr lang="en-US"/>
           </a:p>
@@ -3216,7 +3216,7 @@
           <a:p>
             <a:fld id="{316DB34A-2BC5-44F7-82CD-9ED99B745D5F}" type="datetimeFigureOut">
               <a:rPr lang="en-US" smtClean="0"/>
-              <a:t>12/17/2020</a:t>
+              <a:t>12/21/2020</a:t>
             </a:fld>
             <a:endParaRPr lang="en-US"/>
           </a:p>
@@ -3459,7 +3459,7 @@
           <a:p>
             <a:fld id="{316DB34A-2BC5-44F7-82CD-9ED99B745D5F}" type="datetimeFigureOut">
               <a:rPr lang="en-US" smtClean="0"/>
-              <a:t>12/17/2020</a:t>
+              <a:t>12/21/2020</a:t>
             </a:fld>
             <a:endParaRPr lang="en-US"/>
           </a:p>
@@ -5255,9 +5255,8 @@
                 </a:ext>
               </a:extLst>
             </a:blip>
-            <a:stretch>
-              <a:fillRect/>
-            </a:stretch>
+            <a:srcRect/>
+            <a:stretch/>
           </p:blipFill>
           <p:spPr>
             <a:xfrm>
@@ -5350,7 +5349,7 @@
           <p:spPr>
             <a:xfrm>
               <a:off x="7987087" y="365125"/>
-              <a:ext cx="2966375" cy="2274435"/>
+              <a:ext cx="2966375" cy="2274434"/>
             </a:xfrm>
             <a:prstGeom prst="rect">
               <a:avLst/>
@@ -5527,7 +5526,7 @@
           <p:spPr>
             <a:xfrm>
               <a:off x="792171" y="364360"/>
-              <a:ext cx="2925257" cy="2275200"/>
+              <a:ext cx="2925257" cy="2275199"/>
             </a:xfrm>
             <a:prstGeom prst="rect">
               <a:avLst/>
@@ -5548,7 +5547,7 @@
           </p:nvSpPr>
           <p:spPr>
             <a:xfrm>
-              <a:off x="2471344" y="3920247"/>
+              <a:off x="2270008" y="3945414"/>
               <a:ext cx="557605" cy="497795"/>
             </a:xfrm>
             <a:prstGeom prst="rect">
@@ -5604,7 +5603,7 @@
           <p:spPr>
             <a:xfrm flipH="1" flipV="1">
               <a:off x="1116806" y="2421731"/>
-              <a:ext cx="1354538" cy="1498516"/>
+              <a:ext cx="1153202" cy="1523683"/>
             </a:xfrm>
             <a:prstGeom prst="line">
               <a:avLst/>
@@ -5646,8 +5645,8 @@
           </p:nvCxnSpPr>
           <p:spPr>
             <a:xfrm flipV="1">
-              <a:off x="3024048" y="2421731"/>
-              <a:ext cx="557605" cy="1498516"/>
+              <a:off x="2827613" y="2421731"/>
+              <a:ext cx="754040" cy="1523683"/>
             </a:xfrm>
             <a:prstGeom prst="line">
               <a:avLst/>

</xml_diff>